<commit_message>
4th chapter done, appendices and restructuring of the 1st remain
</commit_message>
<xml_diff>
--- a/Seminarium Dyplomowe/Seminarium dyplomowe - prezka 2.pptx
+++ b/Seminarium Dyplomowe/Seminarium dyplomowe - prezka 2.pptx
@@ -5,10 +5,10 @@
     <p:sldMasterId id="2147483649" r:id="rId1"/>
   </p:sldMasterIdLst>
   <p:notesMasterIdLst>
-    <p:notesMasterId r:id="rId14"/>
+    <p:notesMasterId r:id="rId16"/>
   </p:notesMasterIdLst>
   <p:handoutMasterIdLst>
-    <p:handoutMasterId r:id="rId15"/>
+    <p:handoutMasterId r:id="rId17"/>
   </p:handoutMasterIdLst>
   <p:sldIdLst>
     <p:sldId id="256" r:id="rId2"/>
@@ -21,8 +21,10 @@
     <p:sldId id="270" r:id="rId9"/>
     <p:sldId id="271" r:id="rId10"/>
     <p:sldId id="272" r:id="rId11"/>
-    <p:sldId id="273" r:id="rId12"/>
-    <p:sldId id="274" r:id="rId13"/>
+    <p:sldId id="275" r:id="rId12"/>
+    <p:sldId id="276" r:id="rId13"/>
+    <p:sldId id="273" r:id="rId14"/>
+    <p:sldId id="274" r:id="rId15"/>
   </p:sldIdLst>
   <p:sldSz cx="9144000" cy="6858000" type="screen4x3"/>
   <p:notesSz cx="6797675" cy="9926638"/>
@@ -274,7 +276,7 @@
               <a:pPr>
                 <a:defRPr/>
               </a:pPr>
-              <a:t>23.05.2024</a:t>
+              <a:t>25.05.2024</a:t>
             </a:fld>
             <a:endParaRPr lang="pl-PL"/>
           </a:p>
@@ -492,7 +494,7 @@
               <a:pPr>
                 <a:defRPr/>
               </a:pPr>
-              <a:t>23.05.2024</a:t>
+              <a:t>25.05.2024</a:t>
             </a:fld>
             <a:endParaRPr lang="pl-PL"/>
           </a:p>
@@ -818,6 +820,372 @@
     </a:lvl9pPr>
   </p:notesStyle>
 </p:notesMaster>
+</file>
+
+<file path=ppt/notesSlides/notesSlide1.xml><?xml version="1.0" encoding="utf-8"?>
+<p:notes xmlns:a="http://schemas.openxmlformats.org/drawingml/2006/main" xmlns:r="http://schemas.openxmlformats.org/officeDocument/2006/relationships" xmlns:p="http://schemas.openxmlformats.org/presentationml/2006/main">
+  <p:cSld>
+    <p:spTree>
+      <p:nvGrpSpPr>
+        <p:cNvPr id="1" name=""/>
+        <p:cNvGrpSpPr/>
+        <p:nvPr/>
+      </p:nvGrpSpPr>
+      <p:grpSpPr>
+        <a:xfrm>
+          <a:off x="0" y="0"/>
+          <a:ext cx="0" cy="0"/>
+          <a:chOff x="0" y="0"/>
+          <a:chExt cx="0" cy="0"/>
+        </a:xfrm>
+      </p:grpSpPr>
+      <p:sp>
+        <p:nvSpPr>
+          <p:cNvPr id="2" name="Symbol zastępczy obrazu slajdu 1"/>
+          <p:cNvSpPr>
+            <a:spLocks noGrp="1" noRot="1" noChangeAspect="1"/>
+          </p:cNvSpPr>
+          <p:nvPr>
+            <p:ph type="sldImg"/>
+          </p:nvPr>
+        </p:nvSpPr>
+        <p:spPr/>
+      </p:sp>
+      <p:sp>
+        <p:nvSpPr>
+          <p:cNvPr id="3" name="Symbol zastępczy notatek 2"/>
+          <p:cNvSpPr>
+            <a:spLocks noGrp="1"/>
+          </p:cNvSpPr>
+          <p:nvPr>
+            <p:ph type="body" idx="1"/>
+          </p:nvPr>
+        </p:nvSpPr>
+        <p:spPr/>
+        <p:txBody>
+          <a:bodyPr/>
+          <a:lstStyle/>
+          <a:p>
+            <a:r>
+              <a:rPr lang="pl-PL" b="0" i="0" dirty="0">
+                <a:effectLst/>
+                <a:latin typeface="gg sans"/>
+              </a:rPr>
+              <a:t>Jakiegoś terminu się trzymać: fabuła, historia </a:t>
+            </a:r>
+            <a:endParaRPr lang="pl-PL" dirty="0"/>
+          </a:p>
+        </p:txBody>
+      </p:sp>
+      <p:sp>
+        <p:nvSpPr>
+          <p:cNvPr id="4" name="Symbol zastępczy numeru slajdu 3"/>
+          <p:cNvSpPr>
+            <a:spLocks noGrp="1"/>
+          </p:cNvSpPr>
+          <p:nvPr>
+            <p:ph type="sldNum" sz="quarter" idx="5"/>
+          </p:nvPr>
+        </p:nvSpPr>
+        <p:spPr/>
+        <p:txBody>
+          <a:bodyPr/>
+          <a:lstStyle/>
+          <a:p>
+            <a:fld id="{B6D0BAD2-00FE-4C1B-9A35-55748BEDD6F3}" type="slidenum">
+              <a:rPr lang="pl-PL" altLang="pl-PL" smtClean="0"/>
+              <a:pPr/>
+              <a:t>1</a:t>
+            </a:fld>
+            <a:endParaRPr lang="pl-PL" altLang="pl-PL"/>
+          </a:p>
+        </p:txBody>
+      </p:sp>
+    </p:spTree>
+    <p:extLst>
+      <p:ext uri="{BB962C8B-B14F-4D97-AF65-F5344CB8AC3E}">
+        <p14:creationId xmlns:p14="http://schemas.microsoft.com/office/powerpoint/2010/main" val="1620610241"/>
+      </p:ext>
+    </p:extLst>
+  </p:cSld>
+  <p:clrMapOvr>
+    <a:masterClrMapping/>
+  </p:clrMapOvr>
+</p:notes>
+</file>
+
+<file path=ppt/notesSlides/notesSlide2.xml><?xml version="1.0" encoding="utf-8"?>
+<p:notes xmlns:a="http://schemas.openxmlformats.org/drawingml/2006/main" xmlns:r="http://schemas.openxmlformats.org/officeDocument/2006/relationships" xmlns:p="http://schemas.openxmlformats.org/presentationml/2006/main">
+  <p:cSld>
+    <p:spTree>
+      <p:nvGrpSpPr>
+        <p:cNvPr id="1" name=""/>
+        <p:cNvGrpSpPr/>
+        <p:nvPr/>
+      </p:nvGrpSpPr>
+      <p:grpSpPr>
+        <a:xfrm>
+          <a:off x="0" y="0"/>
+          <a:ext cx="0" cy="0"/>
+          <a:chOff x="0" y="0"/>
+          <a:chExt cx="0" cy="0"/>
+        </a:xfrm>
+      </p:grpSpPr>
+      <p:sp>
+        <p:nvSpPr>
+          <p:cNvPr id="2" name="Symbol zastępczy obrazu slajdu 1"/>
+          <p:cNvSpPr>
+            <a:spLocks noGrp="1" noRot="1" noChangeAspect="1"/>
+          </p:cNvSpPr>
+          <p:nvPr>
+            <p:ph type="sldImg"/>
+          </p:nvPr>
+        </p:nvSpPr>
+        <p:spPr/>
+      </p:sp>
+      <p:sp>
+        <p:nvSpPr>
+          <p:cNvPr id="3" name="Symbol zastępczy notatek 2"/>
+          <p:cNvSpPr>
+            <a:spLocks noGrp="1"/>
+          </p:cNvSpPr>
+          <p:nvPr>
+            <p:ph type="body" idx="1"/>
+          </p:nvPr>
+        </p:nvSpPr>
+        <p:spPr/>
+        <p:txBody>
+          <a:bodyPr/>
+          <a:lstStyle/>
+          <a:p>
+            <a:r>
+              <a:rPr lang="en-US" b="0" i="0" dirty="0" err="1">
+                <a:solidFill>
+                  <a:srgbClr val="C8C3BC"/>
+                </a:solidFill>
+                <a:effectLst/>
+                <a:highlight>
+                  <a:srgbClr val="181A1B"/>
+                </a:highlight>
+                <a:latin typeface="Helvetica Neue"/>
+              </a:rPr>
+              <a:t>Ren'Py</a:t>
+            </a:r>
+            <a:r>
+              <a:rPr lang="en-US" b="0" i="0" dirty="0">
+                <a:solidFill>
+                  <a:srgbClr val="C8C3BC"/>
+                </a:solidFill>
+                <a:effectLst/>
+                <a:highlight>
+                  <a:srgbClr val="181A1B"/>
+                </a:highlight>
+                <a:latin typeface="Helvetica Neue"/>
+              </a:rPr>
+              <a:t> is a free and cross platform engine for digital storytelling</a:t>
+            </a:r>
+            <a:r>
+              <a:rPr lang="pl-PL" b="0" i="0" dirty="0">
+                <a:solidFill>
+                  <a:srgbClr val="C8C3BC"/>
+                </a:solidFill>
+                <a:effectLst/>
+                <a:highlight>
+                  <a:srgbClr val="181A1B"/>
+                </a:highlight>
+                <a:latin typeface="Helvetica Neue"/>
+              </a:rPr>
+              <a:t>. </a:t>
+            </a:r>
+            <a:r>
+              <a:rPr lang="en-US" b="0" i="0" dirty="0" err="1">
+                <a:solidFill>
+                  <a:srgbClr val="C8C3BC"/>
+                </a:solidFill>
+                <a:effectLst/>
+                <a:highlight>
+                  <a:srgbClr val="181A1B"/>
+                </a:highlight>
+                <a:latin typeface="Helvetica Neue"/>
+              </a:rPr>
+              <a:t>Ren'Py</a:t>
+            </a:r>
+            <a:r>
+              <a:rPr lang="en-US" b="0" i="0" dirty="0">
+                <a:solidFill>
+                  <a:srgbClr val="C8C3BC"/>
+                </a:solidFill>
+                <a:effectLst/>
+                <a:highlight>
+                  <a:srgbClr val="181A1B"/>
+                </a:highlight>
+                <a:latin typeface="Helvetica Neue"/>
+              </a:rPr>
+              <a:t> is free to use with commercial and non-commercial games</a:t>
+            </a:r>
+            <a:r>
+              <a:rPr lang="pl-PL" b="0" i="0" dirty="0">
+                <a:solidFill>
+                  <a:srgbClr val="C8C3BC"/>
+                </a:solidFill>
+                <a:effectLst/>
+                <a:highlight>
+                  <a:srgbClr val="181A1B"/>
+                </a:highlight>
+                <a:latin typeface="Helvetica Neue"/>
+              </a:rPr>
+              <a:t> + Open Source</a:t>
+            </a:r>
+            <a:endParaRPr lang="pl-PL" b="0" i="0" dirty="0">
+              <a:effectLst/>
+              <a:latin typeface="gg sans"/>
+            </a:endParaRPr>
+          </a:p>
+          <a:p>
+            <a:endParaRPr lang="pl-PL" b="0" i="0" dirty="0">
+              <a:effectLst/>
+              <a:latin typeface="gg sans"/>
+            </a:endParaRPr>
+          </a:p>
+          <a:p>
+            <a:r>
+              <a:rPr lang="pl-PL" b="0" i="0" dirty="0">
+                <a:effectLst/>
+                <a:latin typeface="gg sans"/>
+              </a:rPr>
+              <a:t>Każda postać to inna sesja z LLM. </a:t>
+            </a:r>
+            <a:endParaRPr lang="pl-PL" dirty="0"/>
+          </a:p>
+        </p:txBody>
+      </p:sp>
+      <p:sp>
+        <p:nvSpPr>
+          <p:cNvPr id="4" name="Symbol zastępczy numeru slajdu 3"/>
+          <p:cNvSpPr>
+            <a:spLocks noGrp="1"/>
+          </p:cNvSpPr>
+          <p:nvPr>
+            <p:ph type="sldNum" sz="quarter" idx="5"/>
+          </p:nvPr>
+        </p:nvSpPr>
+        <p:spPr/>
+        <p:txBody>
+          <a:bodyPr/>
+          <a:lstStyle/>
+          <a:p>
+            <a:fld id="{B6D0BAD2-00FE-4C1B-9A35-55748BEDD6F3}" type="slidenum">
+              <a:rPr lang="pl-PL" altLang="pl-PL" smtClean="0"/>
+              <a:pPr/>
+              <a:t>7</a:t>
+            </a:fld>
+            <a:endParaRPr lang="pl-PL" altLang="pl-PL"/>
+          </a:p>
+        </p:txBody>
+      </p:sp>
+    </p:spTree>
+    <p:extLst>
+      <p:ext uri="{BB962C8B-B14F-4D97-AF65-F5344CB8AC3E}">
+        <p14:creationId xmlns:p14="http://schemas.microsoft.com/office/powerpoint/2010/main" val="3906154802"/>
+      </p:ext>
+    </p:extLst>
+  </p:cSld>
+  <p:clrMapOvr>
+    <a:masterClrMapping/>
+  </p:clrMapOvr>
+</p:notes>
+</file>
+
+<file path=ppt/notesSlides/notesSlide3.xml><?xml version="1.0" encoding="utf-8"?>
+<p:notes xmlns:a="http://schemas.openxmlformats.org/drawingml/2006/main" xmlns:r="http://schemas.openxmlformats.org/officeDocument/2006/relationships" xmlns:p="http://schemas.openxmlformats.org/presentationml/2006/main">
+  <p:cSld>
+    <p:spTree>
+      <p:nvGrpSpPr>
+        <p:cNvPr id="1" name=""/>
+        <p:cNvGrpSpPr/>
+        <p:nvPr/>
+      </p:nvGrpSpPr>
+      <p:grpSpPr>
+        <a:xfrm>
+          <a:off x="0" y="0"/>
+          <a:ext cx="0" cy="0"/>
+          <a:chOff x="0" y="0"/>
+          <a:chExt cx="0" cy="0"/>
+        </a:xfrm>
+      </p:grpSpPr>
+      <p:sp>
+        <p:nvSpPr>
+          <p:cNvPr id="2" name="Symbol zastępczy obrazu slajdu 1"/>
+          <p:cNvSpPr>
+            <a:spLocks noGrp="1" noRot="1" noChangeAspect="1"/>
+          </p:cNvSpPr>
+          <p:nvPr>
+            <p:ph type="sldImg"/>
+          </p:nvPr>
+        </p:nvSpPr>
+        <p:spPr/>
+      </p:sp>
+      <p:sp>
+        <p:nvSpPr>
+          <p:cNvPr id="3" name="Symbol zastępczy notatek 2"/>
+          <p:cNvSpPr>
+            <a:spLocks noGrp="1"/>
+          </p:cNvSpPr>
+          <p:nvPr>
+            <p:ph type="body" idx="1"/>
+          </p:nvPr>
+        </p:nvSpPr>
+        <p:spPr/>
+        <p:txBody>
+          <a:bodyPr/>
+          <a:lstStyle/>
+          <a:p>
+            <a:r>
+              <a:rPr lang="pl-PL" b="0" i="0" dirty="0">
+                <a:effectLst/>
+                <a:latin typeface="gg sans"/>
+              </a:rPr>
+              <a:t>Uzasadnić że mało ludzi dlatego jest taki dziki A/B.</a:t>
+            </a:r>
+            <a:endParaRPr lang="pl-PL" dirty="0"/>
+          </a:p>
+        </p:txBody>
+      </p:sp>
+      <p:sp>
+        <p:nvSpPr>
+          <p:cNvPr id="4" name="Symbol zastępczy numeru slajdu 3"/>
+          <p:cNvSpPr>
+            <a:spLocks noGrp="1"/>
+          </p:cNvSpPr>
+          <p:nvPr>
+            <p:ph type="sldNum" sz="quarter" idx="5"/>
+          </p:nvPr>
+        </p:nvSpPr>
+        <p:spPr/>
+        <p:txBody>
+          <a:bodyPr/>
+          <a:lstStyle/>
+          <a:p>
+            <a:fld id="{B6D0BAD2-00FE-4C1B-9A35-55748BEDD6F3}" type="slidenum">
+              <a:rPr lang="pl-PL" altLang="pl-PL" smtClean="0"/>
+              <a:pPr/>
+              <a:t>8</a:t>
+            </a:fld>
+            <a:endParaRPr lang="pl-PL" altLang="pl-PL"/>
+          </a:p>
+        </p:txBody>
+      </p:sp>
+    </p:spTree>
+    <p:extLst>
+      <p:ext uri="{BB962C8B-B14F-4D97-AF65-F5344CB8AC3E}">
+        <p14:creationId xmlns:p14="http://schemas.microsoft.com/office/powerpoint/2010/main" val="3157952274"/>
+      </p:ext>
+    </p:extLst>
+  </p:cSld>
+  <p:clrMapOvr>
+    <a:masterClrMapping/>
+  </p:clrMapOvr>
+</p:notes>
 </file>
 
 <file path=ppt/slideLayouts/slideLayout1.xml><?xml version="1.0" encoding="utf-8"?>
@@ -6539,7 +6907,7 @@
           <a:p>
             <a:r>
               <a:rPr lang="pl-PL" altLang="pl-PL" dirty="0"/>
-              <a:t>Wyniki (2/2)</a:t>
+              <a:t>Wyniki (1/2)</a:t>
             </a:r>
           </a:p>
         </p:txBody>
@@ -6669,6 +7037,228 @@
       </p:grpSpPr>
       <p:sp>
         <p:nvSpPr>
+          <p:cNvPr id="2" name="Symbol zastępczy zawartości 1">
+            <a:extLst>
+              <a:ext uri="{FF2B5EF4-FFF2-40B4-BE49-F238E27FC236}">
+                <a16:creationId xmlns:a16="http://schemas.microsoft.com/office/drawing/2014/main" id="{FF0156DD-BCE8-6E46-7D68-9C1594F99FC3}"/>
+              </a:ext>
+            </a:extLst>
+          </p:cNvPr>
+          <p:cNvSpPr>
+            <a:spLocks noGrp="1"/>
+          </p:cNvSpPr>
+          <p:nvPr>
+            <p:ph sz="half" idx="1"/>
+          </p:nvPr>
+        </p:nvSpPr>
+        <p:spPr/>
+        <p:txBody>
+          <a:bodyPr/>
+          <a:lstStyle/>
+          <a:p>
+            <a:endParaRPr lang="pl-PL"/>
+          </a:p>
+        </p:txBody>
+      </p:sp>
+      <p:sp>
+        <p:nvSpPr>
+          <p:cNvPr id="3" name="Symbol zastępczy tekstu 2">
+            <a:extLst>
+              <a:ext uri="{FF2B5EF4-FFF2-40B4-BE49-F238E27FC236}">
+                <a16:creationId xmlns:a16="http://schemas.microsoft.com/office/drawing/2014/main" id="{65A90AB3-669B-6AB7-04F4-0DFFC9EE7E60}"/>
+              </a:ext>
+            </a:extLst>
+          </p:cNvPr>
+          <p:cNvSpPr>
+            <a:spLocks noGrp="1"/>
+          </p:cNvSpPr>
+          <p:nvPr>
+            <p:ph type="body" idx="10"/>
+          </p:nvPr>
+        </p:nvSpPr>
+        <p:spPr/>
+        <p:txBody>
+          <a:bodyPr/>
+          <a:lstStyle/>
+          <a:p>
+            <a:endParaRPr lang="pl-PL"/>
+          </a:p>
+        </p:txBody>
+      </p:sp>
+      <p:sp>
+        <p:nvSpPr>
+          <p:cNvPr id="4" name="Symbol zastępczy tekstu 3">
+            <a:extLst>
+              <a:ext uri="{FF2B5EF4-FFF2-40B4-BE49-F238E27FC236}">
+                <a16:creationId xmlns:a16="http://schemas.microsoft.com/office/drawing/2014/main" id="{9D5CCAE7-5458-D3B6-740C-1452088F44B5}"/>
+              </a:ext>
+            </a:extLst>
+          </p:cNvPr>
+          <p:cNvSpPr>
+            <a:spLocks noGrp="1"/>
+          </p:cNvSpPr>
+          <p:nvPr>
+            <p:ph type="body" idx="11"/>
+          </p:nvPr>
+        </p:nvSpPr>
+        <p:spPr/>
+        <p:txBody>
+          <a:bodyPr/>
+          <a:lstStyle/>
+          <a:p>
+            <a:r>
+              <a:rPr lang="pl-PL" dirty="0"/>
+              <a:t>Wyniki (2/2)</a:t>
+            </a:r>
+          </a:p>
+        </p:txBody>
+      </p:sp>
+    </p:spTree>
+    <p:extLst>
+      <p:ext uri="{BB962C8B-B14F-4D97-AF65-F5344CB8AC3E}">
+        <p14:creationId xmlns:p14="http://schemas.microsoft.com/office/powerpoint/2010/main" val="4091000658"/>
+      </p:ext>
+    </p:extLst>
+  </p:cSld>
+  <p:clrMapOvr>
+    <a:masterClrMapping/>
+  </p:clrMapOvr>
+  <p:transition>
+    <p:randomBar/>
+  </p:transition>
+</p:sld>
+</file>
+
+<file path=ppt/slides/slide12.xml><?xml version="1.0" encoding="utf-8"?>
+<p:sld xmlns:a="http://schemas.openxmlformats.org/drawingml/2006/main" xmlns:r="http://schemas.openxmlformats.org/officeDocument/2006/relationships" xmlns:p="http://schemas.openxmlformats.org/presentationml/2006/main">
+  <p:cSld>
+    <p:spTree>
+      <p:nvGrpSpPr>
+        <p:cNvPr id="1" name=""/>
+        <p:cNvGrpSpPr/>
+        <p:nvPr/>
+      </p:nvGrpSpPr>
+      <p:grpSpPr>
+        <a:xfrm>
+          <a:off x="0" y="0"/>
+          <a:ext cx="0" cy="0"/>
+          <a:chOff x="0" y="0"/>
+          <a:chExt cx="0" cy="0"/>
+        </a:xfrm>
+      </p:grpSpPr>
+      <p:sp>
+        <p:nvSpPr>
+          <p:cNvPr id="2" name="Symbol zastępczy zawartości 1">
+            <a:extLst>
+              <a:ext uri="{FF2B5EF4-FFF2-40B4-BE49-F238E27FC236}">
+                <a16:creationId xmlns:a16="http://schemas.microsoft.com/office/drawing/2014/main" id="{F1BA91DA-D27F-3FC6-7255-9FED183C55D1}"/>
+              </a:ext>
+            </a:extLst>
+          </p:cNvPr>
+          <p:cNvSpPr>
+            <a:spLocks noGrp="1"/>
+          </p:cNvSpPr>
+          <p:nvPr>
+            <p:ph sz="half" idx="1"/>
+          </p:nvPr>
+        </p:nvSpPr>
+        <p:spPr/>
+        <p:txBody>
+          <a:bodyPr/>
+          <a:lstStyle/>
+          <a:p>
+            <a:endParaRPr lang="pl-PL"/>
+          </a:p>
+        </p:txBody>
+      </p:sp>
+      <p:sp>
+        <p:nvSpPr>
+          <p:cNvPr id="3" name="Symbol zastępczy tekstu 2">
+            <a:extLst>
+              <a:ext uri="{FF2B5EF4-FFF2-40B4-BE49-F238E27FC236}">
+                <a16:creationId xmlns:a16="http://schemas.microsoft.com/office/drawing/2014/main" id="{A7D59622-44C7-D2DC-AAE1-EB279E865730}"/>
+              </a:ext>
+            </a:extLst>
+          </p:cNvPr>
+          <p:cNvSpPr>
+            <a:spLocks noGrp="1"/>
+          </p:cNvSpPr>
+          <p:nvPr>
+            <p:ph type="body" idx="10"/>
+          </p:nvPr>
+        </p:nvSpPr>
+        <p:spPr/>
+        <p:txBody>
+          <a:bodyPr/>
+          <a:lstStyle/>
+          <a:p>
+            <a:endParaRPr lang="pl-PL"/>
+          </a:p>
+        </p:txBody>
+      </p:sp>
+      <p:sp>
+        <p:nvSpPr>
+          <p:cNvPr id="4" name="Symbol zastępczy tekstu 3">
+            <a:extLst>
+              <a:ext uri="{FF2B5EF4-FFF2-40B4-BE49-F238E27FC236}">
+                <a16:creationId xmlns:a16="http://schemas.microsoft.com/office/drawing/2014/main" id="{637B7C2E-23E5-A56C-2C9A-F8265E1C3A86}"/>
+              </a:ext>
+            </a:extLst>
+          </p:cNvPr>
+          <p:cNvSpPr>
+            <a:spLocks noGrp="1"/>
+          </p:cNvSpPr>
+          <p:nvPr>
+            <p:ph type="body" idx="11"/>
+          </p:nvPr>
+        </p:nvSpPr>
+        <p:spPr/>
+        <p:txBody>
+          <a:bodyPr/>
+          <a:lstStyle/>
+          <a:p>
+            <a:r>
+              <a:rPr lang="pl-PL" dirty="0"/>
+              <a:t>Podsumowanie</a:t>
+            </a:r>
+          </a:p>
+        </p:txBody>
+      </p:sp>
+    </p:spTree>
+    <p:extLst>
+      <p:ext uri="{BB962C8B-B14F-4D97-AF65-F5344CB8AC3E}">
+        <p14:creationId xmlns:p14="http://schemas.microsoft.com/office/powerpoint/2010/main" val="1439142404"/>
+      </p:ext>
+    </p:extLst>
+  </p:cSld>
+  <p:clrMapOvr>
+    <a:masterClrMapping/>
+  </p:clrMapOvr>
+  <p:transition>
+    <p:randomBar/>
+  </p:transition>
+</p:sld>
+</file>
+
+<file path=ppt/slides/slide13.xml><?xml version="1.0" encoding="utf-8"?>
+<p:sld xmlns:a="http://schemas.openxmlformats.org/drawingml/2006/main" xmlns:r="http://schemas.openxmlformats.org/officeDocument/2006/relationships" xmlns:p="http://schemas.openxmlformats.org/presentationml/2006/main">
+  <p:cSld>
+    <p:spTree>
+      <p:nvGrpSpPr>
+        <p:cNvPr id="1" name=""/>
+        <p:cNvGrpSpPr/>
+        <p:nvPr/>
+      </p:nvGrpSpPr>
+      <p:grpSpPr>
+        <a:xfrm>
+          <a:off x="0" y="0"/>
+          <a:ext cx="0" cy="0"/>
+          <a:chOff x="0" y="0"/>
+          <a:chExt cx="0" cy="0"/>
+        </a:xfrm>
+      </p:grpSpPr>
+      <p:sp>
+        <p:nvSpPr>
           <p:cNvPr id="14338" name="Symbol zastępczy zawartości 1">
             <a:extLst>
               <a:ext uri="{FF2B5EF4-FFF2-40B4-BE49-F238E27FC236}">
@@ -6776,7 +7366,7 @@
           <a:p>
             <a:r>
               <a:rPr lang="pl-PL" altLang="pl-PL" dirty="0"/>
-              <a:t>Podsumowanie</a:t>
+              <a:t>Kolejne kroki</a:t>
             </a:r>
           </a:p>
         </p:txBody>
@@ -6797,7 +7387,7 @@
 </p:sld>
 </file>
 
-<file path=ppt/slides/slide12.xml><?xml version="1.0" encoding="utf-8"?>
+<file path=ppt/slides/slide14.xml><?xml version="1.0" encoding="utf-8"?>
 <p:sld xmlns:a="http://schemas.openxmlformats.org/drawingml/2006/main" xmlns:r="http://schemas.openxmlformats.org/officeDocument/2006/relationships" xmlns:p="http://schemas.openxmlformats.org/presentationml/2006/main">
   <p:cSld>
     <p:spTree>
@@ -8507,14 +9097,14 @@
           <p:nvPr/>
         </p:nvPicPr>
         <p:blipFill>
-          <a:blip r:embed="rId2"/>
+          <a:blip r:embed="rId3"/>
           <a:stretch>
             <a:fillRect/>
           </a:stretch>
         </p:blipFill>
         <p:spPr>
           <a:xfrm>
-            <a:off x="683568" y="2376106"/>
+            <a:off x="684844" y="4076953"/>
             <a:ext cx="4092165" cy="2250690"/>
           </a:xfrm>
           <a:prstGeom prst="rect">
@@ -8537,14 +9127,14 @@
           <p:nvPr/>
         </p:nvPicPr>
         <p:blipFill>
-          <a:blip r:embed="rId3"/>
+          <a:blip r:embed="rId4"/>
           <a:stretch>
             <a:fillRect/>
           </a:stretch>
         </p:blipFill>
         <p:spPr>
           <a:xfrm>
-            <a:off x="4976529" y="2382762"/>
+            <a:off x="4976529" y="4076953"/>
             <a:ext cx="3968321" cy="2250690"/>
           </a:xfrm>
           <a:prstGeom prst="rect">
@@ -8552,6 +9142,171 @@
           </a:prstGeom>
         </p:spPr>
       </p:pic>
+      <p:pic>
+        <p:nvPicPr>
+          <p:cNvPr id="1026" name="Picture 2">
+            <a:extLst>
+              <a:ext uri="{FF2B5EF4-FFF2-40B4-BE49-F238E27FC236}">
+                <a16:creationId xmlns:a16="http://schemas.microsoft.com/office/drawing/2014/main" id="{A386784B-7585-05AE-D8A5-E4EDE213964D}"/>
+              </a:ext>
+            </a:extLst>
+          </p:cNvPr>
+          <p:cNvPicPr>
+            <a:picLocks noChangeAspect="1" noChangeArrowheads="1"/>
+          </p:cNvPicPr>
+          <p:nvPr/>
+        </p:nvPicPr>
+        <p:blipFill>
+          <a:blip r:embed="rId5">
+            <a:extLst>
+              <a:ext uri="{28A0092B-C50C-407E-A947-70E740481C1C}">
+                <a14:useLocalDpi xmlns:a14="http://schemas.microsoft.com/office/drawing/2010/main" val="0"/>
+              </a:ext>
+            </a:extLst>
+          </a:blip>
+          <a:srcRect/>
+          <a:stretch>
+            <a:fillRect/>
+          </a:stretch>
+        </p:blipFill>
+        <p:spPr bwMode="auto">
+          <a:xfrm>
+            <a:off x="1462198" y="1340189"/>
+            <a:ext cx="1267529" cy="1945657"/>
+          </a:xfrm>
+          <a:prstGeom prst="rect">
+            <a:avLst/>
+          </a:prstGeom>
+          <a:noFill/>
+          <a:extLst>
+            <a:ext uri="{909E8E84-426E-40DD-AFC4-6F175D3DCCD1}">
+              <a14:hiddenFill xmlns:a14="http://schemas.microsoft.com/office/drawing/2010/main">
+                <a:solidFill>
+                  <a:srgbClr val="FFFFFF"/>
+                </a:solidFill>
+              </a14:hiddenFill>
+            </a:ext>
+          </a:extLst>
+        </p:spPr>
+      </p:pic>
+      <p:pic>
+        <p:nvPicPr>
+          <p:cNvPr id="5" name="Obraz 4">
+            <a:extLst>
+              <a:ext uri="{FF2B5EF4-FFF2-40B4-BE49-F238E27FC236}">
+                <a16:creationId xmlns:a16="http://schemas.microsoft.com/office/drawing/2014/main" id="{C38AC689-48BF-ED60-1D83-18936CD11AA4}"/>
+              </a:ext>
+            </a:extLst>
+          </p:cNvPr>
+          <p:cNvPicPr>
+            <a:picLocks noChangeAspect="1"/>
+          </p:cNvPicPr>
+          <p:nvPr/>
+        </p:nvPicPr>
+        <p:blipFill>
+          <a:blip r:embed="rId6"/>
+          <a:stretch>
+            <a:fillRect/>
+          </a:stretch>
+        </p:blipFill>
+        <p:spPr>
+          <a:xfrm>
+            <a:off x="3657737" y="1655702"/>
+            <a:ext cx="5287113" cy="1314633"/>
+          </a:xfrm>
+          <a:prstGeom prst="rect">
+            <a:avLst/>
+          </a:prstGeom>
+        </p:spPr>
+      </p:pic>
+      <p:sp>
+        <p:nvSpPr>
+          <p:cNvPr id="6" name="pole tekstowe 5">
+            <a:extLst>
+              <a:ext uri="{FF2B5EF4-FFF2-40B4-BE49-F238E27FC236}">
+                <a16:creationId xmlns:a16="http://schemas.microsoft.com/office/drawing/2014/main" id="{BE264007-FCA6-F0E2-221F-6AA653E63519}"/>
+              </a:ext>
+            </a:extLst>
+          </p:cNvPr>
+          <p:cNvSpPr txBox="1"/>
+          <p:nvPr/>
+        </p:nvSpPr>
+        <p:spPr>
+          <a:xfrm>
+            <a:off x="1447833" y="3285846"/>
+            <a:ext cx="2376264" cy="369332"/>
+          </a:xfrm>
+          <a:prstGeom prst="rect">
+            <a:avLst/>
+          </a:prstGeom>
+          <a:noFill/>
+        </p:spPr>
+        <p:txBody>
+          <a:bodyPr wrap="square" rtlCol="0">
+            <a:spAutoFit/>
+          </a:bodyPr>
+          <a:lstStyle/>
+          <a:p>
+            <a:r>
+              <a:rPr lang="pl-PL" dirty="0"/>
+              <a:t>Logo </a:t>
+            </a:r>
+            <a:r>
+              <a:rPr lang="pl-PL" dirty="0" err="1"/>
+              <a:t>Ren’Py</a:t>
+            </a:r>
+            <a:endParaRPr lang="pl-PL" dirty="0"/>
+          </a:p>
+        </p:txBody>
+      </p:sp>
+      <p:sp>
+        <p:nvSpPr>
+          <p:cNvPr id="7" name="pole tekstowe 6">
+            <a:extLst>
+              <a:ext uri="{FF2B5EF4-FFF2-40B4-BE49-F238E27FC236}">
+                <a16:creationId xmlns:a16="http://schemas.microsoft.com/office/drawing/2014/main" id="{B3ACC7E1-53B1-EDE2-CADB-C21E5606FC00}"/>
+              </a:ext>
+            </a:extLst>
+          </p:cNvPr>
+          <p:cNvSpPr txBox="1"/>
+          <p:nvPr/>
+        </p:nvSpPr>
+        <p:spPr>
+          <a:xfrm>
+            <a:off x="4119838" y="3051031"/>
+            <a:ext cx="4588874" cy="369332"/>
+          </a:xfrm>
+          <a:prstGeom prst="rect">
+            <a:avLst/>
+          </a:prstGeom>
+          <a:noFill/>
+        </p:spPr>
+        <p:txBody>
+          <a:bodyPr wrap="square" rtlCol="0">
+            <a:spAutoFit/>
+          </a:bodyPr>
+          <a:lstStyle/>
+          <a:p>
+            <a:r>
+              <a:rPr lang="pl-PL" dirty="0"/>
+              <a:t>Gry na silniku </a:t>
+            </a:r>
+            <a:r>
+              <a:rPr lang="pl-PL" dirty="0" err="1"/>
+              <a:t>Ren’Py</a:t>
+            </a:r>
+            <a:r>
+              <a:rPr lang="pl-PL" dirty="0"/>
+              <a:t> na platformie </a:t>
+            </a:r>
+            <a:r>
+              <a:rPr lang="pl-PL" dirty="0" err="1"/>
+              <a:t>Steam</a:t>
+            </a:r>
+            <a:endParaRPr lang="pl-PL" dirty="0"/>
+          </a:p>
+        </p:txBody>
+      </p:sp>
     </p:spTree>
     <p:extLst>
       <p:ext uri="{BB962C8B-B14F-4D97-AF65-F5344CB8AC3E}">
@@ -8663,7 +9418,7 @@
           <p:nvPr/>
         </p:nvPicPr>
         <p:blipFill>
-          <a:blip r:embed="rId2"/>
+          <a:blip r:embed="rId3"/>
           <a:stretch>
             <a:fillRect/>
           </a:stretch>
@@ -8739,7 +9494,7 @@
           <a:p>
             <a:r>
               <a:rPr lang="pl-PL" altLang="pl-PL" dirty="0"/>
-              <a:t>Wyniki (1/2)</a:t>
+              <a:t>Próba badawcza</a:t>
             </a:r>
           </a:p>
         </p:txBody>

</xml_diff>